<commit_message>
Updated link in replica exchange slides
</commit_message>
<xml_diff>
--- a/slides/11-18-Replica_Exchange.pptx
+++ b/slides/11-18-Replica_Exchange.pptx
@@ -7078,14 +7078,14 @@
       </p:par>
     </p:tnLst>
     <p:bldLst>
+      <p:bldP build="whole" bldLvl="1" animBg="1" rev="0" advAuto="0" spid="223" grpId="5"/>
+      <p:bldP build="whole" bldLvl="1" animBg="1" rev="0" advAuto="0" spid="230" grpId="6"/>
       <p:bldP build="whole" bldLvl="1" animBg="1" rev="0" advAuto="0" spid="211" grpId="3"/>
+      <p:bldP build="whole" bldLvl="1" animBg="1" rev="0" advAuto="0" spid="240" grpId="8"/>
       <p:bldP build="whole" bldLvl="1" animBg="1" rev="0" advAuto="0" spid="233" grpId="7"/>
-      <p:bldP build="whole" bldLvl="1" animBg="1" rev="0" advAuto="0" spid="230" grpId="6"/>
+      <p:bldP build="whole" bldLvl="1" animBg="1" rev="0" advAuto="0" spid="207" grpId="2"/>
       <p:bldP build="whole" bldLvl="1" animBg="1" rev="0" advAuto="0" spid="200" grpId="1"/>
       <p:bldP build="whole" bldLvl="1" animBg="1" rev="0" advAuto="0" spid="218" grpId="4"/>
-      <p:bldP build="whole" bldLvl="1" animBg="1" rev="0" advAuto="0" spid="240" grpId="8"/>
-      <p:bldP build="whole" bldLvl="1" animBg="1" rev="0" advAuto="0" spid="207" grpId="2"/>
-      <p:bldP build="whole" bldLvl="1" animBg="1" rev="0" advAuto="0" spid="223" grpId="5"/>
     </p:bldLst>
   </p:timing>
 </p:sld>
@@ -7169,7 +7169,7 @@
               <a:rPr u="sng">
                 <a:hlinkClick r:id="rId2" invalidUrl="" action="" tgtFrame="" tooltip="" history="1" highlightClick="0" endSnd="0"/>
               </a:rPr>
-              <a:t>http://mypages.iit.edu/~dminh/images/pubs/dock_1hnn.gif</a:t>
+              <a:t>https://ccbatiit.github.io/images/pubs/dock_1hnn.gif</a:t>
             </a:r>
             <a:r>
               <a:t>.</a:t>

</xml_diff>